<commit_message>
PCM: fix PCMbragg periods
</commit_message>
<xml_diff>
--- a/PCM/PCM_intro.pptx
+++ b/PCM/PCM_intro.pptx
@@ -7,15 +7,19 @@
     <p:sldMasterId id="2147484533" r:id="rId3"/>
   </p:sldMasterIdLst>
   <p:notesMasterIdLst>
-    <p:notesMasterId r:id="rId7"/>
+    <p:notesMasterId r:id="rId11"/>
   </p:notesMasterIdLst>
   <p:handoutMasterIdLst>
-    <p:handoutMasterId r:id="rId8"/>
+    <p:handoutMasterId r:id="rId12"/>
   </p:handoutMasterIdLst>
   <p:sldIdLst>
     <p:sldId id="426" r:id="rId4"/>
     <p:sldId id="450" r:id="rId5"/>
-    <p:sldId id="448" r:id="rId6"/>
+    <p:sldId id="452" r:id="rId6"/>
+    <p:sldId id="448" r:id="rId7"/>
+    <p:sldId id="454" r:id="rId8"/>
+    <p:sldId id="453" r:id="rId9"/>
+    <p:sldId id="455" r:id="rId10"/>
   </p:sldIdLst>
   <p:sldSz cx="9144000" cy="6858000" type="screen4x3"/>
   <p:notesSz cx="6858000" cy="9144000"/>
@@ -280,7 +284,7 @@
             <a:fld id="{16215AEE-C922-4944-98A7-22910184AC8A}" type="datetimeFigureOut">
               <a:rPr lang="en-US" altLang="zh-CN"/>
               <a:pPr/>
-              <a:t>4/11/2019</a:t>
+              <a:t>4/15/2019</a:t>
             </a:fld>
             <a:endParaRPr lang="en-US" altLang="zh-CN"/>
           </a:p>
@@ -484,7 +488,7 @@
             <a:fld id="{CA038EEF-2DAF-6B44-A6B5-C268C3465D47}" type="datetimeFigureOut">
               <a:rPr lang="en-CA" altLang="zh-CN"/>
               <a:pPr/>
-              <a:t>2019-04-11</a:t>
+              <a:t>2019-04-15</a:t>
             </a:fld>
             <a:endParaRPr lang="en-CA" altLang="zh-CN"/>
           </a:p>
@@ -849,10 +853,10 @@
           </a:ln>
           <a:extLst>
             <a:ext uri="{FAA26D3D-D897-4be2-8F04-BA451C77F1D7}">
-              <ma14:placeholderFlag xmlns="" xmlns:ma14="http://schemas.microsoft.com/office/mac/drawingml/2011/main" val="1"/>
+              <ma14:placeholderFlag xmlns:ma14="http://schemas.microsoft.com/office/mac/drawingml/2011/main" xmlns="" val="1"/>
             </a:ext>
             <a:ext uri="{909E8E84-426E-40dd-AFC4-6F175D3DCCD1}">
-              <a14:hiddenFill xmlns:a14="http://schemas.microsoft.com/office/drawing/2010/main" xmlns="">
+              <a14:hiddenFill xmlns="" xmlns:a14="http://schemas.microsoft.com/office/drawing/2010/main">
                 <a:solidFill>
                   <a:srgbClr val="FFFFFF"/>
                 </a:solidFill>
@@ -875,17 +879,17 @@
           <a:noFill/>
           <a:extLst>
             <a:ext uri="{FAA26D3D-D897-4be2-8F04-BA451C77F1D7}">
-              <ma14:placeholderFlag xmlns="" xmlns:ma14="http://schemas.microsoft.com/office/mac/drawingml/2011/main" val="1"/>
+              <ma14:placeholderFlag xmlns:ma14="http://schemas.microsoft.com/office/mac/drawingml/2011/main" xmlns="" val="1"/>
             </a:ext>
             <a:ext uri="{909E8E84-426E-40dd-AFC4-6F175D3DCCD1}">
-              <a14:hiddenFill xmlns:a14="http://schemas.microsoft.com/office/drawing/2010/main" xmlns="">
+              <a14:hiddenFill xmlns="" xmlns:a14="http://schemas.microsoft.com/office/drawing/2010/main">
                 <a:solidFill>
                   <a:srgbClr val="FFFFFF"/>
                 </a:solidFill>
               </a14:hiddenFill>
             </a:ext>
             <a:ext uri="{91240B29-F687-4f45-9708-019B960494DF}">
-              <a14:hiddenLine xmlns:a14="http://schemas.microsoft.com/office/drawing/2010/main" xmlns="" w="9525">
+              <a14:hiddenLine xmlns="" xmlns:a14="http://schemas.microsoft.com/office/drawing/2010/main" w="9525">
                 <a:solidFill>
                   <a:srgbClr val="000000"/>
                 </a:solidFill>
@@ -925,14 +929,14 @@
           <a:noFill/>
           <a:extLst>
             <a:ext uri="{909E8E84-426E-40dd-AFC4-6F175D3DCCD1}">
-              <a14:hiddenFill xmlns:a14="http://schemas.microsoft.com/office/drawing/2010/main" xmlns="">
+              <a14:hiddenFill xmlns="" xmlns:a14="http://schemas.microsoft.com/office/drawing/2010/main">
                 <a:solidFill>
                   <a:srgbClr val="FFFFFF"/>
                 </a:solidFill>
               </a14:hiddenFill>
             </a:ext>
             <a:ext uri="{91240B29-F687-4f45-9708-019B960494DF}">
-              <a14:hiddenLine xmlns:a14="http://schemas.microsoft.com/office/drawing/2010/main" xmlns="" w="9525">
+              <a14:hiddenLine xmlns="" xmlns:a14="http://schemas.microsoft.com/office/drawing/2010/main" w="9525">
                 <a:solidFill>
                   <a:srgbClr val="000000"/>
                 </a:solidFill>
@@ -1263,7 +1267,7 @@
             <a:fld id="{2C31E0B7-D99D-9840-9AA4-AFE996601F1A}" type="datetime1">
               <a:rPr lang="en-US" altLang="zh-CN"/>
               <a:pPr/>
-              <a:t>4/11/2019</a:t>
+              <a:t>4/15/2019</a:t>
             </a:fld>
             <a:endParaRPr lang="en-US" altLang="zh-CN"/>
           </a:p>
@@ -1448,7 +1452,7 @@
             <a:fld id="{8CD81206-CB00-054A-A73E-85C388CF01BA}" type="datetime1">
               <a:rPr lang="en-US" altLang="zh-CN"/>
               <a:pPr/>
-              <a:t>4/11/2019</a:t>
+              <a:t>4/15/2019</a:t>
             </a:fld>
             <a:endParaRPr lang="en-US" altLang="zh-CN"/>
           </a:p>
@@ -1643,7 +1647,7 @@
             <a:fld id="{763C9DB7-BA8E-3248-A482-551635BAD7C2}" type="datetime1">
               <a:rPr lang="en-US" altLang="zh-CN"/>
               <a:pPr/>
-              <a:t>4/11/2019</a:t>
+              <a:t>4/15/2019</a:t>
             </a:fld>
             <a:endParaRPr lang="en-US" altLang="zh-CN"/>
           </a:p>
@@ -1777,7 +1781,7 @@
             <a:fld id="{E076C303-4390-464C-B7E9-6F5306EF3170}" type="datetime1">
               <a:rPr lang="en-US" altLang="zh-CN"/>
               <a:pPr/>
-              <a:t>4/11/2019</a:t>
+              <a:t>4/15/2019</a:t>
             </a:fld>
             <a:endParaRPr lang="en-US" altLang="zh-CN"/>
           </a:p>
@@ -1916,7 +1920,7 @@
             <a:fld id="{5CA8F940-8C0D-5F40-9547-CE421C3644DF}" type="datetime1">
               <a:rPr lang="en-US" altLang="zh-CN" smtClean="0"/>
               <a:pPr/>
-              <a:t>4/11/2019</a:t>
+              <a:t>4/15/2019</a:t>
             </a:fld>
             <a:endParaRPr lang="en-US" altLang="zh-CN"/>
           </a:p>
@@ -2015,14 +2019,14 @@
           </a:ln>
           <a:extLst>
             <a:ext uri="{909E8E84-426E-40dd-AFC4-6F175D3DCCD1}">
-              <a14:hiddenFill xmlns="" xmlns:a14="http://schemas.microsoft.com/office/drawing/2010/main">
+              <a14:hiddenFill xmlns:a14="http://schemas.microsoft.com/office/drawing/2010/main" xmlns="">
                 <a:solidFill>
                   <a:srgbClr val="FFFFFF"/>
                 </a:solidFill>
               </a14:hiddenFill>
             </a:ext>
             <a:ext uri="{91240B29-F687-4f45-9708-019B960494DF}">
-              <a14:hiddenLine xmlns="" xmlns:a14="http://schemas.microsoft.com/office/drawing/2010/main" w="9525">
+              <a14:hiddenLine xmlns:a14="http://schemas.microsoft.com/office/drawing/2010/main" xmlns="" w="9525">
                 <a:solidFill>
                   <a:srgbClr val="000000"/>
                 </a:solidFill>
@@ -2276,14 +2280,14 @@
             </a:ln>
             <a:extLst>
               <a:ext uri="{909E8E84-426E-40dd-AFC4-6F175D3DCCD1}">
-                <a14:hiddenFill xmlns="" xmlns:a14="http://schemas.microsoft.com/office/drawing/2010/main">
+                <a14:hiddenFill xmlns:a14="http://schemas.microsoft.com/office/drawing/2010/main" xmlns="">
                   <a:solidFill>
                     <a:srgbClr val="FFFFFF"/>
                   </a:solidFill>
                 </a14:hiddenFill>
               </a:ext>
               <a:ext uri="{91240B29-F687-4f45-9708-019B960494DF}">
-                <a14:hiddenLine xmlns="" xmlns:a14="http://schemas.microsoft.com/office/drawing/2010/main" w="9525">
+                <a14:hiddenLine xmlns:a14="http://schemas.microsoft.com/office/drawing/2010/main" xmlns="" w="9525">
                   <a:solidFill>
                     <a:srgbClr val="000000"/>
                   </a:solidFill>
@@ -2526,14 +2530,14 @@
           </a:ln>
           <a:extLst>
             <a:ext uri="{909E8E84-426E-40dd-AFC4-6F175D3DCCD1}">
-              <a14:hiddenFill xmlns:a14="http://schemas.microsoft.com/office/drawing/2010/main" xmlns="">
+              <a14:hiddenFill xmlns="" xmlns:a14="http://schemas.microsoft.com/office/drawing/2010/main">
                 <a:solidFill>
                   <a:srgbClr val="FFFFFF"/>
                 </a:solidFill>
               </a14:hiddenFill>
             </a:ext>
             <a:ext uri="{91240B29-F687-4f45-9708-019B960494DF}">
-              <a14:hiddenLine xmlns:a14="http://schemas.microsoft.com/office/drawing/2010/main" xmlns="" w="9525">
+              <a14:hiddenLine xmlns="" xmlns:a14="http://schemas.microsoft.com/office/drawing/2010/main" w="9525">
                 <a:solidFill>
                   <a:srgbClr val="000000"/>
                 </a:solidFill>
@@ -2752,14 +2756,14 @@
             </a:ln>
             <a:extLst>
               <a:ext uri="{909E8E84-426E-40dd-AFC4-6F175D3DCCD1}">
-                <a14:hiddenFill xmlns:a14="http://schemas.microsoft.com/office/drawing/2010/main" xmlns="">
+                <a14:hiddenFill xmlns="" xmlns:a14="http://schemas.microsoft.com/office/drawing/2010/main">
                   <a:solidFill>
                     <a:srgbClr val="FFFFFF"/>
                   </a:solidFill>
                 </a14:hiddenFill>
               </a:ext>
               <a:ext uri="{91240B29-F687-4f45-9708-019B960494DF}">
-                <a14:hiddenLine xmlns:a14="http://schemas.microsoft.com/office/drawing/2010/main" xmlns="" w="9525">
+                <a14:hiddenLine xmlns="" xmlns:a14="http://schemas.microsoft.com/office/drawing/2010/main" w="9525">
                   <a:solidFill>
                     <a:srgbClr val="000000"/>
                   </a:solidFill>
@@ -3116,7 +3120,7 @@
             <a:fld id="{93BCDC2B-E37E-7845-AABF-FC5B18D3CD04}" type="datetime1">
               <a:rPr lang="en-US" altLang="zh-CN" smtClean="0"/>
               <a:pPr/>
-              <a:t>4/11/2019</a:t>
+              <a:t>4/15/2019</a:t>
             </a:fld>
             <a:endParaRPr lang="en-US" altLang="zh-CN"/>
           </a:p>
@@ -3215,14 +3219,14 @@
           </a:ln>
           <a:extLst>
             <a:ext uri="{909E8E84-426E-40dd-AFC4-6F175D3DCCD1}">
-              <a14:hiddenFill xmlns="" xmlns:a14="http://schemas.microsoft.com/office/drawing/2010/main">
+              <a14:hiddenFill xmlns:a14="http://schemas.microsoft.com/office/drawing/2010/main" xmlns="">
                 <a:solidFill>
                   <a:srgbClr val="FFFFFF"/>
                 </a:solidFill>
               </a14:hiddenFill>
             </a:ext>
             <a:ext uri="{91240B29-F687-4f45-9708-019B960494DF}">
-              <a14:hiddenLine xmlns="" xmlns:a14="http://schemas.microsoft.com/office/drawing/2010/main" w="9525">
+              <a14:hiddenLine xmlns:a14="http://schemas.microsoft.com/office/drawing/2010/main" xmlns="" w="9525">
                 <a:solidFill>
                   <a:srgbClr val="000000"/>
                 </a:solidFill>
@@ -3441,14 +3445,14 @@
             </a:ln>
             <a:extLst>
               <a:ext uri="{909E8E84-426E-40dd-AFC4-6F175D3DCCD1}">
-                <a14:hiddenFill xmlns="" xmlns:a14="http://schemas.microsoft.com/office/drawing/2010/main">
+                <a14:hiddenFill xmlns:a14="http://schemas.microsoft.com/office/drawing/2010/main" xmlns="">
                   <a:solidFill>
                     <a:srgbClr val="FFFFFF"/>
                   </a:solidFill>
                 </a14:hiddenFill>
               </a:ext>
               <a:ext uri="{91240B29-F687-4f45-9708-019B960494DF}">
-                <a14:hiddenLine xmlns="" xmlns:a14="http://schemas.microsoft.com/office/drawing/2010/main" w="9525">
+                <a14:hiddenLine xmlns:a14="http://schemas.microsoft.com/office/drawing/2010/main" xmlns="" w="9525">
                   <a:solidFill>
                     <a:srgbClr val="000000"/>
                   </a:solidFill>
@@ -3691,14 +3695,14 @@
           </a:ln>
           <a:extLst>
             <a:ext uri="{909E8E84-426E-40dd-AFC4-6F175D3DCCD1}">
-              <a14:hiddenFill xmlns:a14="http://schemas.microsoft.com/office/drawing/2010/main" xmlns="">
+              <a14:hiddenFill xmlns="" xmlns:a14="http://schemas.microsoft.com/office/drawing/2010/main">
                 <a:solidFill>
                   <a:srgbClr val="FFFFFF"/>
                 </a:solidFill>
               </a14:hiddenFill>
             </a:ext>
             <a:ext uri="{91240B29-F687-4f45-9708-019B960494DF}">
-              <a14:hiddenLine xmlns:a14="http://schemas.microsoft.com/office/drawing/2010/main" xmlns="" w="9525">
+              <a14:hiddenLine xmlns="" xmlns:a14="http://schemas.microsoft.com/office/drawing/2010/main" w="9525">
                 <a:solidFill>
                   <a:srgbClr val="000000"/>
                 </a:solidFill>
@@ -3952,14 +3956,14 @@
             </a:ln>
             <a:extLst>
               <a:ext uri="{909E8E84-426E-40dd-AFC4-6F175D3DCCD1}">
-                <a14:hiddenFill xmlns:a14="http://schemas.microsoft.com/office/drawing/2010/main" xmlns="">
+                <a14:hiddenFill xmlns="" xmlns:a14="http://schemas.microsoft.com/office/drawing/2010/main">
                   <a:solidFill>
                     <a:srgbClr val="FFFFFF"/>
                   </a:solidFill>
                 </a14:hiddenFill>
               </a:ext>
               <a:ext uri="{91240B29-F687-4f45-9708-019B960494DF}">
-                <a14:hiddenLine xmlns:a14="http://schemas.microsoft.com/office/drawing/2010/main" xmlns="" w="9525">
+                <a14:hiddenLine xmlns="" xmlns:a14="http://schemas.microsoft.com/office/drawing/2010/main" w="9525">
                   <a:solidFill>
                     <a:srgbClr val="000000"/>
                   </a:solidFill>
@@ -4186,7 +4190,7 @@
             <a:fld id="{5CA8F940-8C0D-5F40-9547-CE421C3644DF}" type="datetime1">
               <a:rPr lang="en-US" altLang="zh-CN" smtClean="0"/>
               <a:pPr/>
-              <a:t>4/11/2019</a:t>
+              <a:t>4/15/2019</a:t>
             </a:fld>
             <a:endParaRPr lang="en-US" altLang="zh-CN"/>
           </a:p>
@@ -4285,14 +4289,14 @@
           </a:ln>
           <a:extLst>
             <a:ext uri="{909E8E84-426E-40dd-AFC4-6F175D3DCCD1}">
-              <a14:hiddenFill xmlns="" xmlns:a14="http://schemas.microsoft.com/office/drawing/2010/main">
+              <a14:hiddenFill xmlns:a14="http://schemas.microsoft.com/office/drawing/2010/main" xmlns="">
                 <a:solidFill>
                   <a:srgbClr val="FFFFFF"/>
                 </a:solidFill>
               </a14:hiddenFill>
             </a:ext>
             <a:ext uri="{91240B29-F687-4f45-9708-019B960494DF}">
-              <a14:hiddenLine xmlns="" xmlns:a14="http://schemas.microsoft.com/office/drawing/2010/main" w="9525">
+              <a14:hiddenLine xmlns:a14="http://schemas.microsoft.com/office/drawing/2010/main" xmlns="" w="9525">
                 <a:solidFill>
                   <a:srgbClr val="000000"/>
                 </a:solidFill>
@@ -4546,14 +4550,14 @@
             </a:ln>
             <a:extLst>
               <a:ext uri="{909E8E84-426E-40dd-AFC4-6F175D3DCCD1}">
-                <a14:hiddenFill xmlns="" xmlns:a14="http://schemas.microsoft.com/office/drawing/2010/main">
+                <a14:hiddenFill xmlns:a14="http://schemas.microsoft.com/office/drawing/2010/main" xmlns="">
                   <a:solidFill>
                     <a:srgbClr val="FFFFFF"/>
                   </a:solidFill>
                 </a14:hiddenFill>
               </a:ext>
               <a:ext uri="{91240B29-F687-4f45-9708-019B960494DF}">
-                <a14:hiddenLine xmlns="" xmlns:a14="http://schemas.microsoft.com/office/drawing/2010/main" w="9525">
+                <a14:hiddenLine xmlns:a14="http://schemas.microsoft.com/office/drawing/2010/main" xmlns="" w="9525">
                   <a:solidFill>
                     <a:srgbClr val="000000"/>
                   </a:solidFill>
@@ -4796,14 +4800,14 @@
           </a:ln>
           <a:extLst>
             <a:ext uri="{909E8E84-426E-40dd-AFC4-6F175D3DCCD1}">
-              <a14:hiddenFill xmlns:a14="http://schemas.microsoft.com/office/drawing/2010/main" xmlns="">
+              <a14:hiddenFill xmlns="" xmlns:a14="http://schemas.microsoft.com/office/drawing/2010/main">
                 <a:solidFill>
                   <a:srgbClr val="FFFFFF"/>
                 </a:solidFill>
               </a14:hiddenFill>
             </a:ext>
             <a:ext uri="{91240B29-F687-4f45-9708-019B960494DF}">
-              <a14:hiddenLine xmlns:a14="http://schemas.microsoft.com/office/drawing/2010/main" xmlns="" w="9525">
+              <a14:hiddenLine xmlns="" xmlns:a14="http://schemas.microsoft.com/office/drawing/2010/main" w="9525">
                 <a:solidFill>
                   <a:srgbClr val="000000"/>
                 </a:solidFill>
@@ -5187,14 +5191,14 @@
             </a:ln>
             <a:extLst>
               <a:ext uri="{909E8E84-426E-40dd-AFC4-6F175D3DCCD1}">
-                <a14:hiddenFill xmlns:a14="http://schemas.microsoft.com/office/drawing/2010/main" xmlns="">
+                <a14:hiddenFill xmlns="" xmlns:a14="http://schemas.microsoft.com/office/drawing/2010/main">
                   <a:solidFill>
                     <a:srgbClr val="FFFFFF"/>
                   </a:solidFill>
                 </a14:hiddenFill>
               </a:ext>
               <a:ext uri="{91240B29-F687-4f45-9708-019B960494DF}">
-                <a14:hiddenLine xmlns:a14="http://schemas.microsoft.com/office/drawing/2010/main" xmlns="" w="9525">
+                <a14:hiddenLine xmlns="" xmlns:a14="http://schemas.microsoft.com/office/drawing/2010/main" w="9525">
                   <a:solidFill>
                     <a:srgbClr val="000000"/>
                   </a:solidFill>
@@ -5233,7 +5237,7 @@
             <a:fld id="{DD399CBA-90F1-8740-8ACB-6A73FE316139}" type="datetime1">
               <a:rPr lang="en-US" altLang="zh-CN" smtClean="0"/>
               <a:pPr/>
-              <a:t>4/11/2019</a:t>
+              <a:t>4/15/2019</a:t>
             </a:fld>
             <a:endParaRPr lang="en-US" altLang="zh-CN"/>
           </a:p>
@@ -5332,14 +5336,14 @@
           </a:ln>
           <a:extLst>
             <a:ext uri="{909E8E84-426E-40dd-AFC4-6F175D3DCCD1}">
-              <a14:hiddenFill xmlns="" xmlns:a14="http://schemas.microsoft.com/office/drawing/2010/main">
+              <a14:hiddenFill xmlns:a14="http://schemas.microsoft.com/office/drawing/2010/main" xmlns="">
                 <a:solidFill>
                   <a:srgbClr val="FFFFFF"/>
                 </a:solidFill>
               </a14:hiddenFill>
             </a:ext>
             <a:ext uri="{91240B29-F687-4f45-9708-019B960494DF}">
-              <a14:hiddenLine xmlns="" xmlns:a14="http://schemas.microsoft.com/office/drawing/2010/main" w="9525">
+              <a14:hiddenLine xmlns:a14="http://schemas.microsoft.com/office/drawing/2010/main" xmlns="" w="9525">
                 <a:solidFill>
                   <a:srgbClr val="000000"/>
                 </a:solidFill>
@@ -5723,14 +5727,14 @@
             </a:ln>
             <a:extLst>
               <a:ext uri="{909E8E84-426E-40dd-AFC4-6F175D3DCCD1}">
-                <a14:hiddenFill xmlns="" xmlns:a14="http://schemas.microsoft.com/office/drawing/2010/main">
+                <a14:hiddenFill xmlns:a14="http://schemas.microsoft.com/office/drawing/2010/main" xmlns="">
                   <a:solidFill>
                     <a:srgbClr val="FFFFFF"/>
                   </a:solidFill>
                 </a14:hiddenFill>
               </a:ext>
               <a:ext uri="{91240B29-F687-4f45-9708-019B960494DF}">
-                <a14:hiddenLine xmlns="" xmlns:a14="http://schemas.microsoft.com/office/drawing/2010/main" w="9525">
+                <a14:hiddenLine xmlns:a14="http://schemas.microsoft.com/office/drawing/2010/main" xmlns="" w="9525">
                   <a:solidFill>
                     <a:srgbClr val="000000"/>
                   </a:solidFill>
@@ -5808,14 +5812,14 @@
           </a:ln>
           <a:extLst>
             <a:ext uri="{909E8E84-426E-40dd-AFC4-6F175D3DCCD1}">
-              <a14:hiddenFill xmlns="" xmlns:a14="http://schemas.microsoft.com/office/drawing/2010/main">
+              <a14:hiddenFill xmlns:a14="http://schemas.microsoft.com/office/drawing/2010/main" xmlns="">
                 <a:solidFill>
                   <a:srgbClr val="FFFFFF"/>
                 </a:solidFill>
               </a14:hiddenFill>
             </a:ext>
             <a:ext uri="{91240B29-F687-4f45-9708-019B960494DF}">
-              <a14:hiddenLine xmlns="" xmlns:a14="http://schemas.microsoft.com/office/drawing/2010/main" w="9525">
+              <a14:hiddenLine xmlns:a14="http://schemas.microsoft.com/office/drawing/2010/main" xmlns="" w="9525">
                 <a:solidFill>
                   <a:srgbClr val="000000"/>
                 </a:solidFill>
@@ -6034,14 +6038,14 @@
             </a:ln>
             <a:extLst>
               <a:ext uri="{909E8E84-426E-40dd-AFC4-6F175D3DCCD1}">
-                <a14:hiddenFill xmlns="" xmlns:a14="http://schemas.microsoft.com/office/drawing/2010/main">
+                <a14:hiddenFill xmlns:a14="http://schemas.microsoft.com/office/drawing/2010/main" xmlns="">
                   <a:solidFill>
                     <a:srgbClr val="FFFFFF"/>
                   </a:solidFill>
                 </a14:hiddenFill>
               </a:ext>
               <a:ext uri="{91240B29-F687-4f45-9708-019B960494DF}">
-                <a14:hiddenLine xmlns="" xmlns:a14="http://schemas.microsoft.com/office/drawing/2010/main" w="9525">
+                <a14:hiddenLine xmlns:a14="http://schemas.microsoft.com/office/drawing/2010/main" xmlns="" w="9525">
                   <a:solidFill>
                     <a:srgbClr val="000000"/>
                   </a:solidFill>
@@ -6396,7 +6400,7 @@
             <a:fld id="{93BCDC2B-E37E-7845-AABF-FC5B18D3CD04}" type="datetime1">
               <a:rPr lang="en-US" altLang="zh-CN"/>
               <a:pPr/>
-              <a:t>4/11/2019</a:t>
+              <a:t>4/15/2019</a:t>
             </a:fld>
             <a:endParaRPr lang="en-US" altLang="zh-CN"/>
           </a:p>
@@ -6525,14 +6529,14 @@
           </a:ln>
           <a:extLst>
             <a:ext uri="{909E8E84-426E-40dd-AFC4-6F175D3DCCD1}">
-              <a14:hiddenFill xmlns="" xmlns:a14="http://schemas.microsoft.com/office/drawing/2010/main">
+              <a14:hiddenFill xmlns:a14="http://schemas.microsoft.com/office/drawing/2010/main" xmlns="">
                 <a:solidFill>
                   <a:srgbClr val="FFFFFF"/>
                 </a:solidFill>
               </a14:hiddenFill>
             </a:ext>
             <a:ext uri="{91240B29-F687-4f45-9708-019B960494DF}">
-              <a14:hiddenLine xmlns="" xmlns:a14="http://schemas.microsoft.com/office/drawing/2010/main" w="9525">
+              <a14:hiddenLine xmlns:a14="http://schemas.microsoft.com/office/drawing/2010/main" xmlns="" w="9525">
                 <a:solidFill>
                   <a:srgbClr val="000000"/>
                 </a:solidFill>
@@ -6786,14 +6790,14 @@
             </a:ln>
             <a:extLst>
               <a:ext uri="{909E8E84-426E-40dd-AFC4-6F175D3DCCD1}">
-                <a14:hiddenFill xmlns="" xmlns:a14="http://schemas.microsoft.com/office/drawing/2010/main">
+                <a14:hiddenFill xmlns:a14="http://schemas.microsoft.com/office/drawing/2010/main" xmlns="">
                   <a:solidFill>
                     <a:srgbClr val="FFFFFF"/>
                   </a:solidFill>
                 </a14:hiddenFill>
               </a:ext>
               <a:ext uri="{91240B29-F687-4f45-9708-019B960494DF}">
-                <a14:hiddenLine xmlns="" xmlns:a14="http://schemas.microsoft.com/office/drawing/2010/main" w="9525">
+                <a14:hiddenLine xmlns:a14="http://schemas.microsoft.com/office/drawing/2010/main" xmlns="" w="9525">
                   <a:solidFill>
                     <a:srgbClr val="000000"/>
                   </a:solidFill>
@@ -7020,7 +7024,7 @@
             <a:fld id="{5CA8F940-8C0D-5F40-9547-CE421C3644DF}" type="datetime1">
               <a:rPr lang="en-US" altLang="zh-CN"/>
               <a:pPr/>
-              <a:t>4/11/2019</a:t>
+              <a:t>4/15/2019</a:t>
             </a:fld>
             <a:endParaRPr lang="en-US" altLang="zh-CN"/>
           </a:p>
@@ -7149,14 +7153,14 @@
           </a:ln>
           <a:extLst>
             <a:ext uri="{909E8E84-426E-40dd-AFC4-6F175D3DCCD1}">
-              <a14:hiddenFill xmlns="" xmlns:a14="http://schemas.microsoft.com/office/drawing/2010/main">
+              <a14:hiddenFill xmlns:a14="http://schemas.microsoft.com/office/drawing/2010/main" xmlns="">
                 <a:solidFill>
                   <a:srgbClr val="FFFFFF"/>
                 </a:solidFill>
               </a14:hiddenFill>
             </a:ext>
             <a:ext uri="{91240B29-F687-4f45-9708-019B960494DF}">
-              <a14:hiddenLine xmlns="" xmlns:a14="http://schemas.microsoft.com/office/drawing/2010/main" w="9525">
+              <a14:hiddenLine xmlns:a14="http://schemas.microsoft.com/office/drawing/2010/main" xmlns="" w="9525">
                 <a:solidFill>
                   <a:srgbClr val="000000"/>
                 </a:solidFill>
@@ -7540,14 +7544,14 @@
             </a:ln>
             <a:extLst>
               <a:ext uri="{909E8E84-426E-40dd-AFC4-6F175D3DCCD1}">
-                <a14:hiddenFill xmlns="" xmlns:a14="http://schemas.microsoft.com/office/drawing/2010/main">
+                <a14:hiddenFill xmlns:a14="http://schemas.microsoft.com/office/drawing/2010/main" xmlns="">
                   <a:solidFill>
                     <a:srgbClr val="FFFFFF"/>
                   </a:solidFill>
                 </a14:hiddenFill>
               </a:ext>
               <a:ext uri="{91240B29-F687-4f45-9708-019B960494DF}">
-                <a14:hiddenLine xmlns="" xmlns:a14="http://schemas.microsoft.com/office/drawing/2010/main" w="9525">
+                <a14:hiddenLine xmlns:a14="http://schemas.microsoft.com/office/drawing/2010/main" xmlns="" w="9525">
                   <a:solidFill>
                     <a:srgbClr val="000000"/>
                   </a:solidFill>
@@ -7586,7 +7590,7 @@
             <a:fld id="{DD399CBA-90F1-8740-8ACB-6A73FE316139}" type="datetime1">
               <a:rPr lang="en-US" altLang="zh-CN"/>
               <a:pPr/>
-              <a:t>4/11/2019</a:t>
+              <a:t>4/15/2019</a:t>
             </a:fld>
             <a:endParaRPr lang="en-US" altLang="zh-CN"/>
           </a:p>
@@ -7775,7 +7779,7 @@
             <a:fld id="{E65CEB06-13C5-8042-B7D9-86F62FC68B21}" type="datetime1">
               <a:rPr lang="en-US" altLang="zh-CN"/>
               <a:pPr/>
-              <a:t>4/11/2019</a:t>
+              <a:t>4/15/2019</a:t>
             </a:fld>
             <a:endParaRPr lang="en-US" altLang="zh-CN"/>
           </a:p>
@@ -8032,7 +8036,7 @@
             <a:fld id="{2C31E0B7-D99D-9840-9AA4-AFE996601F1A}" type="datetime1">
               <a:rPr lang="en-US" altLang="zh-CN"/>
               <a:pPr/>
-              <a:t>4/11/2019</a:t>
+              <a:t>4/15/2019</a:t>
             </a:fld>
             <a:endParaRPr lang="en-US" altLang="zh-CN"/>
           </a:p>
@@ -8217,7 +8221,7 @@
             <a:fld id="{E65CEB06-13C5-8042-B7D9-86F62FC68B21}" type="datetime1">
               <a:rPr lang="en-US" altLang="zh-CN"/>
               <a:pPr/>
-              <a:t>4/11/2019</a:t>
+              <a:t>4/15/2019</a:t>
             </a:fld>
             <a:endParaRPr lang="en-US" altLang="zh-CN"/>
           </a:p>
@@ -8479,7 +8483,7 @@
             <a:fld id="{385F2447-58C6-0F4D-AFAC-D240FBEAC3D4}" type="datetime1">
               <a:rPr lang="en-US" altLang="zh-CN"/>
               <a:pPr/>
-              <a:t>4/11/2019</a:t>
+              <a:t>4/15/2019</a:t>
             </a:fld>
             <a:endParaRPr lang="en-US" altLang="zh-CN"/>
           </a:p>
@@ -8781,7 +8785,7 @@
             <a:fld id="{E90B6505-6397-EF47-ACB9-9C7F9DC228F7}" type="datetime1">
               <a:rPr lang="en-US" altLang="zh-CN"/>
               <a:pPr/>
-              <a:t>4/11/2019</a:t>
+              <a:t>4/15/2019</a:t>
             </a:fld>
             <a:endParaRPr lang="en-US" altLang="zh-CN"/>
           </a:p>
@@ -9217,7 +9221,7 @@
             <a:fld id="{7DA9DDF0-8E9D-F747-A826-0A16262FD38B}" type="datetime1">
               <a:rPr lang="en-US" altLang="zh-CN"/>
               <a:pPr/>
-              <a:t>4/11/2019</a:t>
+              <a:t>4/15/2019</a:t>
             </a:fld>
             <a:endParaRPr lang="en-US" altLang="zh-CN"/>
           </a:p>
@@ -9351,7 +9355,7 @@
             <a:fld id="{3C451A12-666D-2B4A-9912-EC4A679D5D15}" type="datetime1">
               <a:rPr lang="en-US" altLang="zh-CN"/>
               <a:pPr/>
-              <a:t>4/11/2019</a:t>
+              <a:t>4/15/2019</a:t>
             </a:fld>
             <a:endParaRPr lang="en-US" altLang="zh-CN"/>
           </a:p>
@@ -9463,7 +9467,7 @@
             <a:fld id="{E38B5506-74D3-1544-BC99-3AF1A8C1C66D}" type="datetime1">
               <a:rPr lang="en-US" altLang="zh-CN"/>
               <a:pPr/>
-              <a:t>4/11/2019</a:t>
+              <a:t>4/15/2019</a:t>
             </a:fld>
             <a:endParaRPr lang="en-US" altLang="zh-CN"/>
           </a:p>
@@ -9755,7 +9759,7 @@
             <a:fld id="{E54C1426-CCF5-AF49-BEFF-95069A0371A2}" type="datetime1">
               <a:rPr lang="en-US" altLang="zh-CN"/>
               <a:pPr/>
-              <a:t>4/11/2019</a:t>
+              <a:t>4/15/2019</a:t>
             </a:fld>
             <a:endParaRPr lang="en-US" altLang="zh-CN"/>
           </a:p>
@@ -10030,7 +10034,7 @@
             <a:fld id="{F5DD3FC9-CD0F-8D4D-89C4-5B675B0D57BB}" type="datetime1">
               <a:rPr lang="en-US" altLang="zh-CN"/>
               <a:pPr/>
-              <a:t>4/11/2019</a:t>
+              <a:t>4/15/2019</a:t>
             </a:fld>
             <a:endParaRPr lang="en-US" altLang="zh-CN"/>
           </a:p>
@@ -10215,7 +10219,7 @@
             <a:fld id="{8CD81206-CB00-054A-A73E-85C388CF01BA}" type="datetime1">
               <a:rPr lang="en-US" altLang="zh-CN"/>
               <a:pPr/>
-              <a:t>4/11/2019</a:t>
+              <a:t>4/15/2019</a:t>
             </a:fld>
             <a:endParaRPr lang="en-US" altLang="zh-CN"/>
           </a:p>
@@ -10477,7 +10481,7 @@
             <a:fld id="{385F2447-58C6-0F4D-AFAC-D240FBEAC3D4}" type="datetime1">
               <a:rPr lang="en-US" altLang="zh-CN"/>
               <a:pPr/>
-              <a:t>4/11/2019</a:t>
+              <a:t>4/15/2019</a:t>
             </a:fld>
             <a:endParaRPr lang="en-US" altLang="zh-CN"/>
           </a:p>
@@ -10672,7 +10676,7 @@
             <a:fld id="{763C9DB7-BA8E-3248-A482-551635BAD7C2}" type="datetime1">
               <a:rPr lang="en-US" altLang="zh-CN"/>
               <a:pPr/>
-              <a:t>4/11/2019</a:t>
+              <a:t>4/15/2019</a:t>
             </a:fld>
             <a:endParaRPr lang="en-US" altLang="zh-CN"/>
           </a:p>
@@ -10806,7 +10810,7 @@
             <a:fld id="{E076C303-4390-464C-B7E9-6F5306EF3170}" type="datetime1">
               <a:rPr lang="en-US" altLang="zh-CN"/>
               <a:pPr/>
-              <a:t>4/11/2019</a:t>
+              <a:t>4/15/2019</a:t>
             </a:fld>
             <a:endParaRPr lang="en-US" altLang="zh-CN"/>
           </a:p>
@@ -11108,7 +11112,7 @@
             <a:fld id="{E90B6505-6397-EF47-ACB9-9C7F9DC228F7}" type="datetime1">
               <a:rPr lang="en-US" altLang="zh-CN"/>
               <a:pPr/>
-              <a:t>4/11/2019</a:t>
+              <a:t>4/15/2019</a:t>
             </a:fld>
             <a:endParaRPr lang="en-US" altLang="zh-CN"/>
           </a:p>
@@ -11544,7 +11548,7 @@
             <a:fld id="{7DA9DDF0-8E9D-F747-A826-0A16262FD38B}" type="datetime1">
               <a:rPr lang="en-US" altLang="zh-CN"/>
               <a:pPr/>
-              <a:t>4/11/2019</a:t>
+              <a:t>4/15/2019</a:t>
             </a:fld>
             <a:endParaRPr lang="en-US" altLang="zh-CN"/>
           </a:p>
@@ -11678,7 +11682,7 @@
             <a:fld id="{3C451A12-666D-2B4A-9912-EC4A679D5D15}" type="datetime1">
               <a:rPr lang="en-US" altLang="zh-CN"/>
               <a:pPr/>
-              <a:t>4/11/2019</a:t>
+              <a:t>4/15/2019</a:t>
             </a:fld>
             <a:endParaRPr lang="en-US" altLang="zh-CN"/>
           </a:p>
@@ -11790,7 +11794,7 @@
             <a:fld id="{E38B5506-74D3-1544-BC99-3AF1A8C1C66D}" type="datetime1">
               <a:rPr lang="en-US" altLang="zh-CN"/>
               <a:pPr/>
-              <a:t>4/11/2019</a:t>
+              <a:t>4/15/2019</a:t>
             </a:fld>
             <a:endParaRPr lang="en-US" altLang="zh-CN"/>
           </a:p>
@@ -12082,7 +12086,7 @@
             <a:fld id="{E54C1426-CCF5-AF49-BEFF-95069A0371A2}" type="datetime1">
               <a:rPr lang="en-US" altLang="zh-CN"/>
               <a:pPr/>
-              <a:t>4/11/2019</a:t>
+              <a:t>4/15/2019</a:t>
             </a:fld>
             <a:endParaRPr lang="en-US" altLang="zh-CN"/>
           </a:p>
@@ -12354,7 +12358,7 @@
             <a:fld id="{F5DD3FC9-CD0F-8D4D-89C4-5B675B0D57BB}" type="datetime1">
               <a:rPr lang="en-US" altLang="zh-CN"/>
               <a:pPr/>
-              <a:t>4/11/2019</a:t>
+              <a:t>4/15/2019</a:t>
             </a:fld>
             <a:endParaRPr lang="en-US" altLang="zh-CN"/>
           </a:p>
@@ -12476,17 +12480,17 @@
           </a:ln>
           <a:extLst>
             <a:ext uri="{FAA26D3D-D897-4be2-8F04-BA451C77F1D7}">
-              <ma14:placeholderFlag xmlns="" xmlns:ma14="http://schemas.microsoft.com/office/mac/drawingml/2011/main" val="1"/>
+              <ma14:placeholderFlag xmlns:ma14="http://schemas.microsoft.com/office/mac/drawingml/2011/main" xmlns="" val="1"/>
             </a:ext>
             <a:ext uri="{909E8E84-426E-40dd-AFC4-6F175D3DCCD1}">
-              <a14:hiddenFill xmlns="" xmlns:a14="http://schemas.microsoft.com/office/drawing/2010/main">
+              <a14:hiddenFill xmlns:a14="http://schemas.microsoft.com/office/drawing/2010/main" xmlns="">
                 <a:solidFill>
                   <a:srgbClr val="FFFFFF"/>
                 </a:solidFill>
               </a14:hiddenFill>
             </a:ext>
             <a:ext uri="{91240B29-F687-4f45-9708-019B960494DF}">
-              <a14:hiddenLine xmlns="" xmlns:a14="http://schemas.microsoft.com/office/drawing/2010/main" w="9525">
+              <a14:hiddenLine xmlns:a14="http://schemas.microsoft.com/office/drawing/2010/main" xmlns="" w="9525">
                 <a:solidFill>
                   <a:srgbClr val="000000"/>
                 </a:solidFill>
@@ -12537,17 +12541,17 @@
           </a:ln>
           <a:extLst>
             <a:ext uri="{FAA26D3D-D897-4be2-8F04-BA451C77F1D7}">
-              <ma14:placeholderFlag xmlns="" xmlns:ma14="http://schemas.microsoft.com/office/mac/drawingml/2011/main" val="1"/>
+              <ma14:placeholderFlag xmlns:ma14="http://schemas.microsoft.com/office/mac/drawingml/2011/main" xmlns="" val="1"/>
             </a:ext>
             <a:ext uri="{909E8E84-426E-40dd-AFC4-6F175D3DCCD1}">
-              <a14:hiddenFill xmlns="" xmlns:a14="http://schemas.microsoft.com/office/drawing/2010/main">
+              <a14:hiddenFill xmlns:a14="http://schemas.microsoft.com/office/drawing/2010/main" xmlns="">
                 <a:solidFill>
                   <a:srgbClr val="FFFFFF"/>
                 </a:solidFill>
               </a14:hiddenFill>
             </a:ext>
             <a:ext uri="{91240B29-F687-4f45-9708-019B960494DF}">
-              <a14:hiddenLine xmlns="" xmlns:a14="http://schemas.microsoft.com/office/drawing/2010/main" w="9525">
+              <a14:hiddenLine xmlns:a14="http://schemas.microsoft.com/office/drawing/2010/main" xmlns="" w="9525">
                 <a:solidFill>
                   <a:srgbClr val="000000"/>
                 </a:solidFill>
@@ -12641,7 +12645,7 @@
             <a:fld id="{DF89C5E0-80CB-C842-991E-0650A17D1E84}" type="datetime1">
               <a:rPr lang="en-US" altLang="zh-CN"/>
               <a:pPr/>
-              <a:t>4/11/2019</a:t>
+              <a:t>4/15/2019</a:t>
             </a:fld>
             <a:endParaRPr lang="en-US" altLang="zh-CN"/>
           </a:p>
@@ -13194,17 +13198,17 @@
           </a:ln>
           <a:extLst>
             <a:ext uri="{FAA26D3D-D897-4be2-8F04-BA451C77F1D7}">
-              <ma14:placeholderFlag xmlns:ma14="http://schemas.microsoft.com/office/mac/drawingml/2011/main" xmlns="" val="1"/>
+              <ma14:placeholderFlag xmlns="" xmlns:ma14="http://schemas.microsoft.com/office/mac/drawingml/2011/main" val="1"/>
             </a:ext>
             <a:ext uri="{909E8E84-426E-40dd-AFC4-6F175D3DCCD1}">
-              <a14:hiddenFill xmlns:a14="http://schemas.microsoft.com/office/drawing/2010/main" xmlns="">
+              <a14:hiddenFill xmlns="" xmlns:a14="http://schemas.microsoft.com/office/drawing/2010/main">
                 <a:solidFill>
                   <a:srgbClr val="FFFFFF"/>
                 </a:solidFill>
               </a14:hiddenFill>
             </a:ext>
             <a:ext uri="{91240B29-F687-4f45-9708-019B960494DF}">
-              <a14:hiddenLine xmlns:a14="http://schemas.microsoft.com/office/drawing/2010/main" xmlns="" w="9525">
+              <a14:hiddenLine xmlns="" xmlns:a14="http://schemas.microsoft.com/office/drawing/2010/main" w="9525">
                 <a:solidFill>
                   <a:srgbClr val="000000"/>
                 </a:solidFill>
@@ -13255,17 +13259,17 @@
           </a:ln>
           <a:extLst>
             <a:ext uri="{FAA26D3D-D897-4be2-8F04-BA451C77F1D7}">
-              <ma14:placeholderFlag xmlns:ma14="http://schemas.microsoft.com/office/mac/drawingml/2011/main" xmlns="" val="1"/>
+              <ma14:placeholderFlag xmlns="" xmlns:ma14="http://schemas.microsoft.com/office/mac/drawingml/2011/main" val="1"/>
             </a:ext>
             <a:ext uri="{909E8E84-426E-40dd-AFC4-6F175D3DCCD1}">
-              <a14:hiddenFill xmlns:a14="http://schemas.microsoft.com/office/drawing/2010/main" xmlns="">
+              <a14:hiddenFill xmlns="" xmlns:a14="http://schemas.microsoft.com/office/drawing/2010/main">
                 <a:solidFill>
                   <a:srgbClr val="FFFFFF"/>
                 </a:solidFill>
               </a14:hiddenFill>
             </a:ext>
             <a:ext uri="{91240B29-F687-4f45-9708-019B960494DF}">
-              <a14:hiddenLine xmlns:a14="http://schemas.microsoft.com/office/drawing/2010/main" xmlns="" w="9525">
+              <a14:hiddenLine xmlns="" xmlns:a14="http://schemas.microsoft.com/office/drawing/2010/main" w="9525">
                 <a:solidFill>
                   <a:srgbClr val="000000"/>
                 </a:solidFill>
@@ -13358,7 +13362,7 @@
             <a:fld id="{A47398D4-8B5A-BE43-B588-3D17D5B3482C}" type="datetime1">
               <a:rPr lang="en-US" altLang="zh-CN" smtClean="0"/>
               <a:pPr/>
-              <a:t>4/11/2019</a:t>
+              <a:t>4/15/2019</a:t>
             </a:fld>
             <a:endParaRPr lang="en-US" altLang="zh-CN"/>
           </a:p>
@@ -13907,17 +13911,17 @@
           </a:ln>
           <a:extLst>
             <a:ext uri="{FAA26D3D-D897-4be2-8F04-BA451C77F1D7}">
-              <ma14:placeholderFlag xmlns:ma14="http://schemas.microsoft.com/office/mac/drawingml/2011/main" xmlns="" val="1"/>
+              <ma14:placeholderFlag xmlns="" xmlns:ma14="http://schemas.microsoft.com/office/mac/drawingml/2011/main" val="1"/>
             </a:ext>
             <a:ext uri="{909E8E84-426E-40dd-AFC4-6F175D3DCCD1}">
-              <a14:hiddenFill xmlns:a14="http://schemas.microsoft.com/office/drawing/2010/main" xmlns="">
+              <a14:hiddenFill xmlns="" xmlns:a14="http://schemas.microsoft.com/office/drawing/2010/main">
                 <a:solidFill>
                   <a:srgbClr val="FFFFFF"/>
                 </a:solidFill>
               </a14:hiddenFill>
             </a:ext>
             <a:ext uri="{91240B29-F687-4f45-9708-019B960494DF}">
-              <a14:hiddenLine xmlns:a14="http://schemas.microsoft.com/office/drawing/2010/main" xmlns="" w="9525">
+              <a14:hiddenLine xmlns="" xmlns:a14="http://schemas.microsoft.com/office/drawing/2010/main" w="9525">
                 <a:solidFill>
                   <a:srgbClr val="000000"/>
                 </a:solidFill>
@@ -13968,17 +13972,17 @@
           </a:ln>
           <a:extLst>
             <a:ext uri="{FAA26D3D-D897-4be2-8F04-BA451C77F1D7}">
-              <ma14:placeholderFlag xmlns:ma14="http://schemas.microsoft.com/office/mac/drawingml/2011/main" xmlns="" val="1"/>
+              <ma14:placeholderFlag xmlns="" xmlns:ma14="http://schemas.microsoft.com/office/mac/drawingml/2011/main" val="1"/>
             </a:ext>
             <a:ext uri="{909E8E84-426E-40dd-AFC4-6F175D3DCCD1}">
-              <a14:hiddenFill xmlns:a14="http://schemas.microsoft.com/office/drawing/2010/main" xmlns="">
+              <a14:hiddenFill xmlns="" xmlns:a14="http://schemas.microsoft.com/office/drawing/2010/main">
                 <a:solidFill>
                   <a:srgbClr val="FFFFFF"/>
                 </a:solidFill>
               </a14:hiddenFill>
             </a:ext>
             <a:ext uri="{91240B29-F687-4f45-9708-019B960494DF}">
-              <a14:hiddenLine xmlns:a14="http://schemas.microsoft.com/office/drawing/2010/main" xmlns="" w="9525">
+              <a14:hiddenLine xmlns="" xmlns:a14="http://schemas.microsoft.com/office/drawing/2010/main" w="9525">
                 <a:solidFill>
                   <a:srgbClr val="000000"/>
                 </a:solidFill>
@@ -14072,7 +14076,7 @@
             <a:fld id="{DF89C5E0-80CB-C842-991E-0650A17D1E84}" type="datetime1">
               <a:rPr lang="en-US" altLang="zh-CN"/>
               <a:pPr/>
-              <a:t>4/11/2019</a:t>
+              <a:t>4/15/2019</a:t>
             </a:fld>
             <a:endParaRPr lang="en-US" altLang="zh-CN"/>
           </a:p>
@@ -14641,14 +14645,14 @@
           </a:ln>
           <a:extLst>
             <a:ext uri="{909E8E84-426E-40dd-AFC4-6F175D3DCCD1}">
-              <a14:hiddenFill xmlns:a14="http://schemas.microsoft.com/office/drawing/2010/main" xmlns="">
+              <a14:hiddenFill xmlns="" xmlns:a14="http://schemas.microsoft.com/office/drawing/2010/main">
                 <a:solidFill>
                   <a:srgbClr val="FFFFFF"/>
                 </a:solidFill>
               </a14:hiddenFill>
             </a:ext>
             <a:ext uri="{91240B29-F687-4f45-9708-019B960494DF}">
-              <a14:hiddenLine xmlns:a14="http://schemas.microsoft.com/office/drawing/2010/main" xmlns="" w="9525">
+              <a14:hiddenLine xmlns="" xmlns:a14="http://schemas.microsoft.com/office/drawing/2010/main" w="9525">
                 <a:solidFill>
                   <a:srgbClr val="000000"/>
                 </a:solidFill>
@@ -14693,6 +14697,12 @@
               </a:rPr>
               <a:t>-TOOLS:</a:t>
             </a:r>
+            <a:r>
+              <a:rPr kumimoji="0" lang="en-US" altLang="zh-CN" sz="3200" b="1" dirty="0">
+                <a:ea typeface="ＭＳ Ｐゴシック" charset="-128"/>
+              </a:rPr>
+              <a:t/>
+            </a:r>
             <a:br>
               <a:rPr kumimoji="0" lang="en-US" altLang="zh-CN" sz="3200" b="1" dirty="0">
                 <a:ea typeface="ＭＳ Ｐゴシック" charset="-128"/>
@@ -14702,7 +14712,13 @@
               <a:rPr kumimoji="0" lang="en-US" altLang="zh-CN" sz="3200" b="1" dirty="0">
                 <a:ea typeface="ＭＳ Ｐゴシック" charset="-128"/>
               </a:rPr>
-              <a:t>Process Control Monitors Structure</a:t>
+              <a:t>Process Control Monitors </a:t>
+            </a:r>
+            <a:r>
+              <a:rPr kumimoji="0" lang="en-US" altLang="zh-CN" sz="3200" b="1" dirty="0" smtClean="0">
+                <a:ea typeface="ＭＳ Ｐゴシック" charset="-128"/>
+              </a:rPr>
+              <a:t>Structures</a:t>
             </a:r>
             <a:endParaRPr kumimoji="0" lang="en-US" altLang="zh-CN" sz="2000" b="1" dirty="0">
               <a:ea typeface="ＭＳ Ｐゴシック" charset="-128"/>
@@ -14731,8 +14747,21 @@
                   <a:schemeClr val="bg1"/>
                 </a:solidFill>
               </a:rPr>
-              <a:t>  ©2018</a:t>
-            </a:r>
+              <a:t>  ©</a:t>
+            </a:r>
+            <a:r>
+              <a:rPr lang="en-US" altLang="zh-CN" dirty="0" smtClean="0">
+                <a:solidFill>
+                  <a:schemeClr val="bg1"/>
+                </a:solidFill>
+              </a:rPr>
+              <a:t>2019</a:t>
+            </a:r>
+            <a:endParaRPr lang="en-US" altLang="zh-CN" dirty="0">
+              <a:solidFill>
+                <a:schemeClr val="bg1"/>
+              </a:solidFill>
+            </a:endParaRPr>
           </a:p>
         </p:txBody>
       </p:sp>
@@ -14758,14 +14787,14 @@
           </a:ln>
           <a:extLst>
             <a:ext uri="{909E8E84-426E-40dd-AFC4-6F175D3DCCD1}">
-              <a14:hiddenFill xmlns:a14="http://schemas.microsoft.com/office/drawing/2010/main" xmlns="">
+              <a14:hiddenFill xmlns="" xmlns:a14="http://schemas.microsoft.com/office/drawing/2010/main">
                 <a:solidFill>
                   <a:srgbClr val="FFFFFF"/>
                 </a:solidFill>
               </a14:hiddenFill>
             </a:ext>
             <a:ext uri="{91240B29-F687-4f45-9708-019B960494DF}">
-              <a14:hiddenLine xmlns:a14="http://schemas.microsoft.com/office/drawing/2010/main" xmlns="" w="9525">
+              <a14:hiddenLine xmlns="" xmlns:a14="http://schemas.microsoft.com/office/drawing/2010/main" w="9525">
                 <a:solidFill>
                   <a:srgbClr val="000000"/>
                 </a:solidFill>
@@ -14944,6 +14973,13 @@
   <p:clrMapOvr>
     <a:masterClrMapping/>
   </p:clrMapOvr>
+  <p:timing>
+    <p:tnLst>
+      <p:par>
+        <p:cTn id="1" dur="indefinite" restart="never" nodeType="tmRoot"/>
+      </p:par>
+    </p:tnLst>
+  </p:timing>
 </p:sld>
 </file>
 
@@ -15011,8 +15047,13 @@
             </a:r>
             <a:r>
               <a:rPr lang="en-US" altLang="zh-CN" dirty="0"/>
-              <a:t> ©2018</a:t>
-            </a:r>
+              <a:t> ©</a:t>
+            </a:r>
+            <a:r>
+              <a:rPr lang="en-US" altLang="zh-CN" dirty="0" smtClean="0"/>
+              <a:t>2019</a:t>
+            </a:r>
+            <a:endParaRPr lang="en-US" altLang="zh-CN" dirty="0"/>
           </a:p>
         </p:txBody>
       </p:sp>
@@ -15078,8 +15119,45 @@
                   <a:srgbClr val="002060"/>
                 </a:solidFill>
               </a:rPr>
-              <a:t>Load URL of automated measurements</a:t>
-            </a:r>
+              <a:t>Load </a:t>
+            </a:r>
+            <a:r>
+              <a:rPr lang="en-US" dirty="0" smtClean="0">
+                <a:solidFill>
+                  <a:srgbClr val="002060"/>
+                </a:solidFill>
+              </a:rPr>
+              <a:t>the</a:t>
+            </a:r>
+            <a:r>
+              <a:rPr lang="en-US" dirty="0" smtClean="0">
+                <a:solidFill>
+                  <a:srgbClr val="002060"/>
+                </a:solidFill>
+              </a:rPr>
+              <a:t> URL with all data of </a:t>
+            </a:r>
+            <a:r>
+              <a:rPr lang="en-US" dirty="0">
+                <a:solidFill>
+                  <a:srgbClr val="002060"/>
+                </a:solidFill>
+              </a:rPr>
+              <a:t>automated </a:t>
+            </a:r>
+            <a:r>
+              <a:rPr lang="en-US" dirty="0" smtClean="0">
+                <a:solidFill>
+                  <a:srgbClr val="002060"/>
+                </a:solidFill>
+              </a:rPr>
+              <a:t>measurements </a:t>
+            </a:r>
+            <a:endParaRPr lang="en-US" dirty="0">
+              <a:solidFill>
+                <a:srgbClr val="002060"/>
+              </a:solidFill>
+            </a:endParaRPr>
           </a:p>
           <a:p>
             <a:pPr marL="342900" indent="-342900">
@@ -15091,7 +15169,23 @@
                   <a:srgbClr val="002060"/>
                 </a:solidFill>
               </a:rPr>
-              <a:t>Load polarization of automated measurements</a:t>
+              <a:t>Load </a:t>
+            </a:r>
+            <a:r>
+              <a:rPr lang="en-US" dirty="0" smtClean="0">
+                <a:solidFill>
+                  <a:srgbClr val="002060"/>
+                </a:solidFill>
+              </a:rPr>
+              <a:t>the polarization </a:t>
+            </a:r>
+            <a:r>
+              <a:rPr lang="en-US" dirty="0">
+                <a:solidFill>
+                  <a:srgbClr val="002060"/>
+                </a:solidFill>
+              </a:rPr>
+              <a:t>of automated measurements</a:t>
             </a:r>
           </a:p>
           <a:p>
@@ -15099,13 +15193,18 @@
               <a:buAutoNum type="arabicParenR"/>
             </a:pPr>
             <a:r>
-              <a:rPr lang="en-US" dirty="0">
+              <a:rPr lang="en-US" dirty="0" smtClean="0">
                 <a:solidFill>
                   <a:srgbClr val="002060"/>
                 </a:solidFill>
               </a:rPr>
-              <a:t>Run!</a:t>
-            </a:r>
+              <a:t>Run the automated PCM analysis script</a:t>
+            </a:r>
+            <a:endParaRPr lang="en-US" dirty="0">
+              <a:solidFill>
+                <a:srgbClr val="002060"/>
+              </a:solidFill>
+            </a:endParaRPr>
           </a:p>
           <a:p>
             <a:pPr marL="342900" indent="-342900">
@@ -15116,43 +15215,6 @@
                 <a:srgbClr val="002060"/>
               </a:solidFill>
             </a:endParaRPr>
-          </a:p>
-        </p:txBody>
-      </p:sp>
-      <p:sp>
-        <p:nvSpPr>
-          <p:cNvPr id="5" name="Rectangle 4">
-            <a:extLst>
-              <a:ext uri="{FF2B5EF4-FFF2-40B4-BE49-F238E27FC236}">
-                <a16:creationId xmlns:a16="http://schemas.microsoft.com/office/drawing/2014/main" id="{CA1F227F-5F40-4C79-8BFB-CBDE78DF2E29}"/>
-              </a:ext>
-            </a:extLst>
-          </p:cNvPr>
-          <p:cNvSpPr/>
-          <p:nvPr/>
-        </p:nvSpPr>
-        <p:spPr>
-          <a:xfrm>
-            <a:off x="483468" y="2197868"/>
-            <a:ext cx="8203332" cy="276999"/>
-          </a:xfrm>
-          <a:prstGeom prst="rect">
-            <a:avLst/>
-          </a:prstGeom>
-        </p:spPr>
-        <p:txBody>
-          <a:bodyPr wrap="square">
-            <a:spAutoFit/>
-          </a:bodyPr>
-          <a:lstStyle/>
-          <a:p>
-            <a:r>
-              <a:rPr lang="en-CA" sz="1200" dirty="0">
-                <a:hlinkClick r:id="rId2"/>
-              </a:rPr>
-              <a:t>https://github.com/SiEPIC-Kits/SiEPIC_Photonics_Package/tree/master/SiEPIC_Photonics_Package/PCM_analysis</a:t>
-            </a:r>
-            <a:endParaRPr lang="en-CA" sz="1200" dirty="0"/>
           </a:p>
         </p:txBody>
       </p:sp>
@@ -15171,7 +15233,7 @@
           <p:nvPr/>
         </p:nvPicPr>
         <p:blipFill>
-          <a:blip r:embed="rId3"/>
+          <a:blip r:embed="rId2"/>
           <a:stretch>
             <a:fillRect/>
           </a:stretch>
@@ -15201,15 +15263,15 @@
           <p:nvPr/>
         </p:nvPicPr>
         <p:blipFill>
-          <a:blip r:embed="rId4"/>
+          <a:blip r:embed="rId3"/>
           <a:stretch>
             <a:fillRect/>
           </a:stretch>
         </p:blipFill>
         <p:spPr>
           <a:xfrm>
-            <a:off x="-10906" y="5229200"/>
-            <a:ext cx="9144000" cy="752182"/>
+            <a:off x="-324544" y="4579426"/>
+            <a:ext cx="9577064" cy="1513870"/>
           </a:xfrm>
           <a:prstGeom prst="rect">
             <a:avLst/>
@@ -15226,6 +15288,13 @@
   <p:clrMapOvr>
     <a:masterClrMapping/>
   </p:clrMapOvr>
+  <p:timing>
+    <p:tnLst>
+      <p:par>
+        <p:cTn id="1" dur="indefinite" restart="never" nodeType="tmRoot"/>
+      </p:par>
+    </p:tnLst>
+  </p:timing>
 </p:sld>
 </file>
 
@@ -15261,10 +15330,7 @@
           <a:bodyPr/>
           <a:lstStyle/>
           <a:p>
-            <a:r>
-              <a:rPr lang="en-US" sz="2000" b="1" dirty="0"/>
-              <a:t>Objectives</a:t>
-            </a:r>
+            <a:endParaRPr lang="en-US"/>
           </a:p>
         </p:txBody>
       </p:sp>
@@ -15284,17 +15350,18 @@
           <a:lstStyle/>
           <a:p>
             <a:r>
-              <a:rPr lang="en-US" altLang="zh-CN" dirty="0"/>
-              <a:t> M. </a:t>
-            </a:r>
-            <a:r>
-              <a:rPr lang="en-US" altLang="zh-CN" dirty="0" err="1"/>
+              <a:rPr lang="en-US" altLang="zh-CN" dirty="0" smtClean="0"/>
+              <a:t>M. </a:t>
+            </a:r>
+            <a:r>
+              <a:rPr lang="en-US" altLang="zh-CN" dirty="0" err="1" smtClean="0"/>
               <a:t>Hammood</a:t>
             </a:r>
             <a:r>
-              <a:rPr lang="en-US" altLang="zh-CN" dirty="0"/>
-              <a:t> ©2018</a:t>
-            </a:r>
+              <a:rPr lang="en-US" altLang="zh-CN" dirty="0" smtClean="0"/>
+              <a:t> ©2013</a:t>
+            </a:r>
+            <a:endParaRPr lang="en-US" altLang="zh-CN" dirty="0"/>
           </a:p>
         </p:txBody>
       </p:sp>
@@ -15317,6 +15384,148 @@
               <a:rPr lang="en-US" altLang="zh-CN" smtClean="0"/>
               <a:pPr/>
               <a:t>3</a:t>
+            </a:fld>
+            <a:endParaRPr lang="en-US" altLang="zh-CN"/>
+          </a:p>
+        </p:txBody>
+      </p:sp>
+      <p:pic>
+        <p:nvPicPr>
+          <p:cNvPr id="5" name="Picture 4"/>
+          <p:cNvPicPr>
+            <a:picLocks noChangeAspect="1"/>
+          </p:cNvPicPr>
+          <p:nvPr/>
+        </p:nvPicPr>
+        <p:blipFill>
+          <a:blip r:embed="rId2"/>
+          <a:stretch>
+            <a:fillRect/>
+          </a:stretch>
+        </p:blipFill>
+        <p:spPr>
+          <a:xfrm>
+            <a:off x="-50077" y="0"/>
+            <a:ext cx="9194077" cy="6858000"/>
+          </a:xfrm>
+          <a:prstGeom prst="rect">
+            <a:avLst/>
+          </a:prstGeom>
+        </p:spPr>
+      </p:pic>
+    </p:spTree>
+    <p:extLst>
+      <p:ext uri="{BB962C8B-B14F-4D97-AF65-F5344CB8AC3E}">
+        <p14:creationId xmlns:p14="http://schemas.microsoft.com/office/powerpoint/2010/main" val="590135110"/>
+      </p:ext>
+    </p:extLst>
+  </p:cSld>
+  <p:clrMapOvr>
+    <a:masterClrMapping/>
+  </p:clrMapOvr>
+  <p:timing>
+    <p:tnLst>
+      <p:par>
+        <p:cTn id="1" dur="indefinite" restart="never" nodeType="tmRoot"/>
+      </p:par>
+    </p:tnLst>
+  </p:timing>
+</p:sld>
+</file>
+
+<file path=ppt/slides/slide4.xml><?xml version="1.0" encoding="utf-8"?>
+<p:sld xmlns:a="http://schemas.openxmlformats.org/drawingml/2006/main" xmlns:r="http://schemas.openxmlformats.org/officeDocument/2006/relationships" xmlns:p="http://schemas.openxmlformats.org/presentationml/2006/main">
+  <p:cSld>
+    <p:spTree>
+      <p:nvGrpSpPr>
+        <p:cNvPr id="1" name=""/>
+        <p:cNvGrpSpPr/>
+        <p:nvPr/>
+      </p:nvGrpSpPr>
+      <p:grpSpPr>
+        <a:xfrm>
+          <a:off x="0" y="0"/>
+          <a:ext cx="0" cy="0"/>
+          <a:chOff x="0" y="0"/>
+          <a:chExt cx="0" cy="0"/>
+        </a:xfrm>
+      </p:grpSpPr>
+      <p:sp>
+        <p:nvSpPr>
+          <p:cNvPr id="2" name="Title 1"/>
+          <p:cNvSpPr>
+            <a:spLocks noGrp="1"/>
+          </p:cNvSpPr>
+          <p:nvPr>
+            <p:ph type="title"/>
+          </p:nvPr>
+        </p:nvSpPr>
+        <p:spPr/>
+        <p:txBody>
+          <a:bodyPr/>
+          <a:lstStyle/>
+          <a:p>
+            <a:r>
+              <a:rPr lang="en-US" sz="2000" b="1" dirty="0"/>
+              <a:t>Objectives</a:t>
+            </a:r>
+          </a:p>
+        </p:txBody>
+      </p:sp>
+      <p:sp>
+        <p:nvSpPr>
+          <p:cNvPr id="3" name="Footer Placeholder 2"/>
+          <p:cNvSpPr>
+            <a:spLocks noGrp="1"/>
+          </p:cNvSpPr>
+          <p:nvPr>
+            <p:ph type="ftr" sz="quarter" idx="11"/>
+          </p:nvPr>
+        </p:nvSpPr>
+        <p:spPr/>
+        <p:txBody>
+          <a:bodyPr/>
+          <a:lstStyle/>
+          <a:p>
+            <a:r>
+              <a:rPr lang="en-US" altLang="zh-CN" dirty="0"/>
+              <a:t> M. </a:t>
+            </a:r>
+            <a:r>
+              <a:rPr lang="en-US" altLang="zh-CN" dirty="0" err="1"/>
+              <a:t>Hammood</a:t>
+            </a:r>
+            <a:r>
+              <a:rPr lang="en-US" altLang="zh-CN" dirty="0"/>
+              <a:t> ©</a:t>
+            </a:r>
+            <a:r>
+              <a:rPr lang="en-US" altLang="zh-CN" dirty="0" smtClean="0"/>
+              <a:t>2019</a:t>
+            </a:r>
+            <a:endParaRPr lang="en-US" altLang="zh-CN" dirty="0"/>
+          </a:p>
+        </p:txBody>
+      </p:sp>
+      <p:sp>
+        <p:nvSpPr>
+          <p:cNvPr id="4" name="Slide Number Placeholder 3"/>
+          <p:cNvSpPr>
+            <a:spLocks noGrp="1"/>
+          </p:cNvSpPr>
+          <p:nvPr>
+            <p:ph type="sldNum" sz="quarter" idx="12"/>
+          </p:nvPr>
+        </p:nvSpPr>
+        <p:spPr/>
+        <p:txBody>
+          <a:bodyPr/>
+          <a:lstStyle/>
+          <a:p>
+            <a:fld id="{17BB8376-F12B-CB44-BE0C-DBE0A170CA7C}" type="slidenum">
+              <a:rPr lang="en-US" altLang="zh-CN" smtClean="0"/>
+              <a:pPr/>
+              <a:t>4</a:t>
             </a:fld>
             <a:endParaRPr lang="en-US" altLang="zh-CN"/>
           </a:p>
@@ -15583,6 +15792,486 @@
   <p:clrMapOvr>
     <a:masterClrMapping/>
   </p:clrMapOvr>
+  <p:timing>
+    <p:tnLst>
+      <p:par>
+        <p:cTn id="1" dur="indefinite" restart="never" nodeType="tmRoot"/>
+      </p:par>
+    </p:tnLst>
+  </p:timing>
+</p:sld>
+</file>
+
+<file path=ppt/slides/slide5.xml><?xml version="1.0" encoding="utf-8"?>
+<p:sld xmlns:a="http://schemas.openxmlformats.org/drawingml/2006/main" xmlns:r="http://schemas.openxmlformats.org/officeDocument/2006/relationships" xmlns:p="http://schemas.openxmlformats.org/presentationml/2006/main">
+  <p:cSld>
+    <p:spTree>
+      <p:nvGrpSpPr>
+        <p:cNvPr id="1" name=""/>
+        <p:cNvGrpSpPr/>
+        <p:nvPr/>
+      </p:nvGrpSpPr>
+      <p:grpSpPr>
+        <a:xfrm>
+          <a:off x="0" y="0"/>
+          <a:ext cx="0" cy="0"/>
+          <a:chOff x="0" y="0"/>
+          <a:chExt cx="0" cy="0"/>
+        </a:xfrm>
+      </p:grpSpPr>
+      <p:sp>
+        <p:nvSpPr>
+          <p:cNvPr id="2" name="Title 1"/>
+          <p:cNvSpPr>
+            <a:spLocks noGrp="1"/>
+          </p:cNvSpPr>
+          <p:nvPr>
+            <p:ph type="title"/>
+          </p:nvPr>
+        </p:nvSpPr>
+        <p:spPr/>
+        <p:txBody>
+          <a:bodyPr/>
+          <a:lstStyle/>
+          <a:p>
+            <a:r>
+              <a:rPr lang="en-US" dirty="0" smtClean="0"/>
+              <a:t>Polarization rotating Bragg gratings</a:t>
+            </a:r>
+            <a:endParaRPr lang="en-US" dirty="0"/>
+          </a:p>
+        </p:txBody>
+      </p:sp>
+      <p:sp>
+        <p:nvSpPr>
+          <p:cNvPr id="3" name="Footer Placeholder 2"/>
+          <p:cNvSpPr>
+            <a:spLocks noGrp="1"/>
+          </p:cNvSpPr>
+          <p:nvPr>
+            <p:ph type="ftr" sz="quarter" idx="11"/>
+          </p:nvPr>
+        </p:nvSpPr>
+        <p:spPr/>
+        <p:txBody>
+          <a:bodyPr/>
+          <a:lstStyle/>
+          <a:p>
+            <a:r>
+              <a:rPr lang="en-US" altLang="zh-CN" dirty="0"/>
+              <a:t> M. </a:t>
+            </a:r>
+            <a:r>
+              <a:rPr lang="en-US" altLang="zh-CN" dirty="0" err="1"/>
+              <a:t>Hammood</a:t>
+            </a:r>
+            <a:r>
+              <a:rPr lang="en-US" altLang="zh-CN" dirty="0"/>
+              <a:t> ©</a:t>
+            </a:r>
+            <a:r>
+              <a:rPr lang="en-US" altLang="zh-CN" dirty="0" smtClean="0"/>
+              <a:t>2019</a:t>
+            </a:r>
+            <a:endParaRPr lang="en-US" altLang="zh-CN" dirty="0"/>
+          </a:p>
+        </p:txBody>
+      </p:sp>
+      <p:sp>
+        <p:nvSpPr>
+          <p:cNvPr id="4" name="Slide Number Placeholder 3"/>
+          <p:cNvSpPr>
+            <a:spLocks noGrp="1"/>
+          </p:cNvSpPr>
+          <p:nvPr>
+            <p:ph type="sldNum" sz="quarter" idx="12"/>
+          </p:nvPr>
+        </p:nvSpPr>
+        <p:spPr/>
+        <p:txBody>
+          <a:bodyPr/>
+          <a:lstStyle/>
+          <a:p>
+            <a:fld id="{17BB8376-F12B-CB44-BE0C-DBE0A170CA7C}" type="slidenum">
+              <a:rPr lang="en-US" altLang="zh-CN" smtClean="0"/>
+              <a:pPr/>
+              <a:t>5</a:t>
+            </a:fld>
+            <a:endParaRPr lang="en-US" altLang="zh-CN"/>
+          </a:p>
+        </p:txBody>
+      </p:sp>
+      <p:pic>
+        <p:nvPicPr>
+          <p:cNvPr id="6" name="Picture 5"/>
+          <p:cNvPicPr>
+            <a:picLocks noChangeAspect="1"/>
+          </p:cNvPicPr>
+          <p:nvPr/>
+        </p:nvPicPr>
+        <p:blipFill>
+          <a:blip r:embed="rId2"/>
+          <a:stretch>
+            <a:fillRect/>
+          </a:stretch>
+        </p:blipFill>
+        <p:spPr>
+          <a:xfrm>
+            <a:off x="2339752" y="1438598"/>
+            <a:ext cx="6669098" cy="4426306"/>
+          </a:xfrm>
+          <a:prstGeom prst="rect">
+            <a:avLst/>
+          </a:prstGeom>
+        </p:spPr>
+      </p:pic>
+      <p:sp>
+        <p:nvSpPr>
+          <p:cNvPr id="7" name="Rectangle 6"/>
+          <p:cNvSpPr/>
+          <p:nvPr/>
+        </p:nvSpPr>
+        <p:spPr>
+          <a:xfrm>
+            <a:off x="53752" y="1692276"/>
+            <a:ext cx="2646040" cy="1477328"/>
+          </a:xfrm>
+          <a:prstGeom prst="rect">
+            <a:avLst/>
+          </a:prstGeom>
+        </p:spPr>
+        <p:txBody>
+          <a:bodyPr wrap="square">
+            <a:spAutoFit/>
+          </a:bodyPr>
+          <a:lstStyle/>
+          <a:p>
+            <a:r>
+              <a:rPr lang="en-US" b="1" dirty="0" smtClean="0"/>
+              <a:t>“Polarization </a:t>
+            </a:r>
+            <a:r>
+              <a:rPr lang="en-US" b="1" dirty="0"/>
+              <a:t>rotation Bragg grating using Si wire waveguide with non-vertical </a:t>
+            </a:r>
+            <a:r>
+              <a:rPr lang="en-US" b="1" dirty="0" smtClean="0"/>
+              <a:t>sidewall”  </a:t>
+            </a:r>
+            <a:r>
+              <a:rPr lang="en-US" dirty="0"/>
+              <a:t>Hideaki </a:t>
+            </a:r>
+            <a:r>
+              <a:rPr lang="en-US" dirty="0" smtClean="0"/>
+              <a:t>Okayama et al.</a:t>
+            </a:r>
+            <a:endParaRPr lang="en-US" dirty="0"/>
+          </a:p>
+        </p:txBody>
+      </p:sp>
+    </p:spTree>
+    <p:extLst>
+      <p:ext uri="{BB962C8B-B14F-4D97-AF65-F5344CB8AC3E}">
+        <p14:creationId xmlns:p14="http://schemas.microsoft.com/office/powerpoint/2010/main" val="3744031306"/>
+      </p:ext>
+    </p:extLst>
+  </p:cSld>
+  <p:clrMapOvr>
+    <a:masterClrMapping/>
+  </p:clrMapOvr>
+  <p:timing>
+    <p:tnLst>
+      <p:par>
+        <p:cTn id="1" dur="indefinite" restart="never" nodeType="tmRoot"/>
+      </p:par>
+    </p:tnLst>
+  </p:timing>
+</p:sld>
+</file>
+
+<file path=ppt/slides/slide6.xml><?xml version="1.0" encoding="utf-8"?>
+<p:sld xmlns:a="http://schemas.openxmlformats.org/drawingml/2006/main" xmlns:r="http://schemas.openxmlformats.org/officeDocument/2006/relationships" xmlns:p="http://schemas.openxmlformats.org/presentationml/2006/main">
+  <p:cSld>
+    <p:spTree>
+      <p:nvGrpSpPr>
+        <p:cNvPr id="1" name=""/>
+        <p:cNvGrpSpPr/>
+        <p:nvPr/>
+      </p:nvGrpSpPr>
+      <p:grpSpPr>
+        <a:xfrm>
+          <a:off x="0" y="0"/>
+          <a:ext cx="0" cy="0"/>
+          <a:chOff x="0" y="0"/>
+          <a:chExt cx="0" cy="0"/>
+        </a:xfrm>
+      </p:grpSpPr>
+      <p:sp>
+        <p:nvSpPr>
+          <p:cNvPr id="2" name="Title 1"/>
+          <p:cNvSpPr>
+            <a:spLocks noGrp="1"/>
+          </p:cNvSpPr>
+          <p:nvPr>
+            <p:ph type="title"/>
+          </p:nvPr>
+        </p:nvSpPr>
+        <p:spPr/>
+        <p:txBody>
+          <a:bodyPr/>
+          <a:lstStyle/>
+          <a:p>
+            <a:r>
+              <a:rPr lang="en-US" dirty="0" smtClean="0"/>
+              <a:t>Polarization rotating Bragg gratings</a:t>
+            </a:r>
+            <a:endParaRPr lang="en-US" dirty="0"/>
+          </a:p>
+        </p:txBody>
+      </p:sp>
+      <p:sp>
+        <p:nvSpPr>
+          <p:cNvPr id="3" name="Footer Placeholder 2"/>
+          <p:cNvSpPr>
+            <a:spLocks noGrp="1"/>
+          </p:cNvSpPr>
+          <p:nvPr>
+            <p:ph type="ftr" sz="quarter" idx="11"/>
+          </p:nvPr>
+        </p:nvSpPr>
+        <p:spPr/>
+        <p:txBody>
+          <a:bodyPr/>
+          <a:lstStyle/>
+          <a:p>
+            <a:r>
+              <a:rPr lang="en-US" altLang="zh-CN" dirty="0"/>
+              <a:t> M. </a:t>
+            </a:r>
+            <a:r>
+              <a:rPr lang="en-US" altLang="zh-CN" dirty="0" err="1"/>
+              <a:t>Hammood</a:t>
+            </a:r>
+            <a:r>
+              <a:rPr lang="en-US" altLang="zh-CN" dirty="0"/>
+              <a:t> ©</a:t>
+            </a:r>
+            <a:r>
+              <a:rPr lang="en-US" altLang="zh-CN" dirty="0" smtClean="0"/>
+              <a:t>2019</a:t>
+            </a:r>
+            <a:endParaRPr lang="en-US" altLang="zh-CN" dirty="0"/>
+          </a:p>
+        </p:txBody>
+      </p:sp>
+      <p:sp>
+        <p:nvSpPr>
+          <p:cNvPr id="4" name="Slide Number Placeholder 3"/>
+          <p:cNvSpPr>
+            <a:spLocks noGrp="1"/>
+          </p:cNvSpPr>
+          <p:nvPr>
+            <p:ph type="sldNum" sz="quarter" idx="12"/>
+          </p:nvPr>
+        </p:nvSpPr>
+        <p:spPr/>
+        <p:txBody>
+          <a:bodyPr/>
+          <a:lstStyle/>
+          <a:p>
+            <a:fld id="{17BB8376-F12B-CB44-BE0C-DBE0A170CA7C}" type="slidenum">
+              <a:rPr lang="en-US" altLang="zh-CN" smtClean="0"/>
+              <a:pPr/>
+              <a:t>6</a:t>
+            </a:fld>
+            <a:endParaRPr lang="en-US" altLang="zh-CN"/>
+          </a:p>
+        </p:txBody>
+      </p:sp>
+      <p:pic>
+        <p:nvPicPr>
+          <p:cNvPr id="5" name="Picture 4"/>
+          <p:cNvPicPr>
+            <a:picLocks noChangeAspect="1"/>
+          </p:cNvPicPr>
+          <p:nvPr/>
+        </p:nvPicPr>
+        <p:blipFill>
+          <a:blip r:embed="rId2"/>
+          <a:stretch>
+            <a:fillRect/>
+          </a:stretch>
+        </p:blipFill>
+        <p:spPr>
+          <a:xfrm>
+            <a:off x="867670" y="1160396"/>
+            <a:ext cx="7304730" cy="4932900"/>
+          </a:xfrm>
+          <a:prstGeom prst="rect">
+            <a:avLst/>
+          </a:prstGeom>
+        </p:spPr>
+      </p:pic>
+    </p:spTree>
+    <p:extLst>
+      <p:ext uri="{BB962C8B-B14F-4D97-AF65-F5344CB8AC3E}">
+        <p14:creationId xmlns:p14="http://schemas.microsoft.com/office/powerpoint/2010/main" val="2435587218"/>
+      </p:ext>
+    </p:extLst>
+  </p:cSld>
+  <p:clrMapOvr>
+    <a:masterClrMapping/>
+  </p:clrMapOvr>
+  <p:timing>
+    <p:tnLst>
+      <p:par>
+        <p:cTn id="1" dur="indefinite" restart="never" nodeType="tmRoot"/>
+      </p:par>
+    </p:tnLst>
+  </p:timing>
+</p:sld>
+</file>
+
+<file path=ppt/slides/slide7.xml><?xml version="1.0" encoding="utf-8"?>
+<p:sld xmlns:a="http://schemas.openxmlformats.org/drawingml/2006/main" xmlns:r="http://schemas.openxmlformats.org/officeDocument/2006/relationships" xmlns:p="http://schemas.openxmlformats.org/presentationml/2006/main">
+  <p:cSld>
+    <p:spTree>
+      <p:nvGrpSpPr>
+        <p:cNvPr id="1" name=""/>
+        <p:cNvGrpSpPr/>
+        <p:nvPr/>
+      </p:nvGrpSpPr>
+      <p:grpSpPr>
+        <a:xfrm>
+          <a:off x="0" y="0"/>
+          <a:ext cx="0" cy="0"/>
+          <a:chOff x="0" y="0"/>
+          <a:chExt cx="0" cy="0"/>
+        </a:xfrm>
+      </p:grpSpPr>
+      <p:sp>
+        <p:nvSpPr>
+          <p:cNvPr id="2" name="Title 1"/>
+          <p:cNvSpPr>
+            <a:spLocks noGrp="1"/>
+          </p:cNvSpPr>
+          <p:nvPr>
+            <p:ph type="title"/>
+          </p:nvPr>
+        </p:nvSpPr>
+        <p:spPr/>
+        <p:txBody>
+          <a:bodyPr/>
+          <a:lstStyle/>
+          <a:p>
+            <a:r>
+              <a:rPr lang="en-US" dirty="0"/>
+              <a:t>Polarization rotating Bragg gratings</a:t>
+            </a:r>
+          </a:p>
+        </p:txBody>
+      </p:sp>
+      <p:sp>
+        <p:nvSpPr>
+          <p:cNvPr id="3" name="Footer Placeholder 2"/>
+          <p:cNvSpPr>
+            <a:spLocks noGrp="1"/>
+          </p:cNvSpPr>
+          <p:nvPr>
+            <p:ph type="ftr" sz="quarter" idx="11"/>
+          </p:nvPr>
+        </p:nvSpPr>
+        <p:spPr/>
+        <p:txBody>
+          <a:bodyPr/>
+          <a:lstStyle/>
+          <a:p>
+            <a:r>
+              <a:rPr lang="en-US" altLang="zh-CN" dirty="0"/>
+              <a:t> M. </a:t>
+            </a:r>
+            <a:r>
+              <a:rPr lang="en-US" altLang="zh-CN" dirty="0" err="1"/>
+              <a:t>Hammood</a:t>
+            </a:r>
+            <a:r>
+              <a:rPr lang="en-US" altLang="zh-CN" dirty="0"/>
+              <a:t> ©</a:t>
+            </a:r>
+            <a:r>
+              <a:rPr lang="en-US" altLang="zh-CN" dirty="0" smtClean="0"/>
+              <a:t>2019</a:t>
+            </a:r>
+            <a:endParaRPr lang="en-US" altLang="zh-CN" dirty="0"/>
+          </a:p>
+        </p:txBody>
+      </p:sp>
+      <p:sp>
+        <p:nvSpPr>
+          <p:cNvPr id="4" name="Slide Number Placeholder 3"/>
+          <p:cNvSpPr>
+            <a:spLocks noGrp="1"/>
+          </p:cNvSpPr>
+          <p:nvPr>
+            <p:ph type="sldNum" sz="quarter" idx="12"/>
+          </p:nvPr>
+        </p:nvSpPr>
+        <p:spPr/>
+        <p:txBody>
+          <a:bodyPr/>
+          <a:lstStyle/>
+          <a:p>
+            <a:fld id="{17BB8376-F12B-CB44-BE0C-DBE0A170CA7C}" type="slidenum">
+              <a:rPr lang="en-US" altLang="zh-CN" smtClean="0"/>
+              <a:pPr/>
+              <a:t>7</a:t>
+            </a:fld>
+            <a:endParaRPr lang="en-US" altLang="zh-CN"/>
+          </a:p>
+        </p:txBody>
+      </p:sp>
+      <p:pic>
+        <p:nvPicPr>
+          <p:cNvPr id="5" name="Picture 4"/>
+          <p:cNvPicPr>
+            <a:picLocks noChangeAspect="1"/>
+          </p:cNvPicPr>
+          <p:nvPr/>
+        </p:nvPicPr>
+        <p:blipFill>
+          <a:blip r:embed="rId2"/>
+          <a:stretch>
+            <a:fillRect/>
+          </a:stretch>
+        </p:blipFill>
+        <p:spPr>
+          <a:xfrm>
+            <a:off x="1043608" y="1556792"/>
+            <a:ext cx="6822736" cy="4022724"/>
+          </a:xfrm>
+          <a:prstGeom prst="rect">
+            <a:avLst/>
+          </a:prstGeom>
+        </p:spPr>
+      </p:pic>
+    </p:spTree>
+    <p:extLst>
+      <p:ext uri="{BB962C8B-B14F-4D97-AF65-F5344CB8AC3E}">
+        <p14:creationId xmlns:p14="http://schemas.microsoft.com/office/powerpoint/2010/main" val="3604989800"/>
+      </p:ext>
+    </p:extLst>
+  </p:cSld>
+  <p:clrMapOvr>
+    <a:masterClrMapping/>
+  </p:clrMapOvr>
+  <p:timing>
+    <p:tnLst>
+      <p:par>
+        <p:cTn id="1" dur="indefinite" restart="never" nodeType="tmRoot"/>
+      </p:par>
+    </p:tnLst>
+  </p:timing>
 </p:sld>
 </file>
 

</xml_diff>